<commit_message>
PCA, LDA, clustering with scaled data
No improvements in the results
</commit_message>
<xml_diff>
--- a/Docs/Final_Presentation.pptx
+++ b/Docs/Final_Presentation.pptx
@@ -9072,8 +9072,8 @@
         </p:blipFill>
         <p:spPr bwMode="auto">
           <a:xfrm>
-            <a:off x="1244457" y="1383370"/>
-            <a:ext cx="9703085" cy="5171778"/>
+            <a:off x="290512" y="2065760"/>
+            <a:ext cx="5635414" cy="3003695"/>
           </a:xfrm>
           <a:prstGeom prst="rect">
             <a:avLst/>
@@ -9090,6 +9090,129 @@
           </a:extLst>
         </p:spPr>
       </p:pic>
+      <p:pic>
+        <p:nvPicPr>
+          <p:cNvPr id="1026" name="Picture 2">
+            <a:extLst>
+              <a:ext uri="{FF2B5EF4-FFF2-40B4-BE49-F238E27FC236}">
+                <a16:creationId xmlns:a16="http://schemas.microsoft.com/office/drawing/2014/main" id="{F681C2B1-EE11-435C-8B19-868C6EB64350}"/>
+              </a:ext>
+            </a:extLst>
+          </p:cNvPr>
+          <p:cNvPicPr>
+            <a:picLocks noChangeAspect="1" noChangeArrowheads="1"/>
+          </p:cNvPicPr>
+          <p:nvPr/>
+        </p:nvPicPr>
+        <p:blipFill>
+          <a:blip r:embed="rId3">
+            <a:extLst>
+              <a:ext uri="{28A0092B-C50C-407E-A947-70E740481C1C}">
+                <a14:useLocalDpi xmlns:a14="http://schemas.microsoft.com/office/drawing/2010/main" val="0"/>
+              </a:ext>
+            </a:extLst>
+          </a:blip>
+          <a:srcRect/>
+          <a:stretch>
+            <a:fillRect/>
+          </a:stretch>
+        </p:blipFill>
+        <p:spPr bwMode="auto">
+          <a:xfrm>
+            <a:off x="6096000" y="2065760"/>
+            <a:ext cx="5805488" cy="3076575"/>
+          </a:xfrm>
+          <a:prstGeom prst="rect">
+            <a:avLst/>
+          </a:prstGeom>
+          <a:noFill/>
+          <a:extLst>
+            <a:ext uri="{909E8E84-426E-40DD-AFC4-6F175D3DCCD1}">
+              <a14:hiddenFill xmlns:a14="http://schemas.microsoft.com/office/drawing/2010/main">
+                <a:solidFill>
+                  <a:srgbClr val="FFFFFF"/>
+                </a:solidFill>
+              </a14:hiddenFill>
+            </a:ext>
+          </a:extLst>
+        </p:spPr>
+      </p:pic>
+      <p:sp>
+        <p:nvSpPr>
+          <p:cNvPr id="4" name="Rectangle 3">
+            <a:extLst>
+              <a:ext uri="{FF2B5EF4-FFF2-40B4-BE49-F238E27FC236}">
+                <a16:creationId xmlns:a16="http://schemas.microsoft.com/office/drawing/2014/main" id="{B33800AE-DB65-4805-B429-5AFC5CE551D7}"/>
+              </a:ext>
+            </a:extLst>
+          </p:cNvPr>
+          <p:cNvSpPr/>
+          <p:nvPr/>
+        </p:nvSpPr>
+        <p:spPr>
+          <a:xfrm>
+            <a:off x="1641318" y="5318158"/>
+            <a:ext cx="3550267" cy="369332"/>
+          </a:xfrm>
+          <a:prstGeom prst="rect">
+            <a:avLst/>
+          </a:prstGeom>
+        </p:spPr>
+        <p:txBody>
+          <a:bodyPr wrap="none">
+            <a:spAutoFit/>
+          </a:bodyPr>
+          <a:lstStyle/>
+          <a:p>
+            <a:r>
+              <a:rPr lang="en-US" dirty="0" err="1"/>
+              <a:t>KMeans</a:t>
+            </a:r>
+            <a:r>
+              <a:rPr lang="en-US" dirty="0"/>
+              <a:t> Clustering – Unscaled Data </a:t>
+            </a:r>
+          </a:p>
+        </p:txBody>
+      </p:sp>
+      <p:sp>
+        <p:nvSpPr>
+          <p:cNvPr id="7" name="Rectangle 6">
+            <a:extLst>
+              <a:ext uri="{FF2B5EF4-FFF2-40B4-BE49-F238E27FC236}">
+                <a16:creationId xmlns:a16="http://schemas.microsoft.com/office/drawing/2014/main" id="{8F16F35E-C900-4B22-B847-9CC28376772F}"/>
+              </a:ext>
+            </a:extLst>
+          </p:cNvPr>
+          <p:cNvSpPr/>
+          <p:nvPr/>
+        </p:nvSpPr>
+        <p:spPr>
+          <a:xfrm>
+            <a:off x="7310940" y="5341066"/>
+            <a:ext cx="3280963" cy="369332"/>
+          </a:xfrm>
+          <a:prstGeom prst="rect">
+            <a:avLst/>
+          </a:prstGeom>
+        </p:spPr>
+        <p:txBody>
+          <a:bodyPr wrap="none">
+            <a:spAutoFit/>
+          </a:bodyPr>
+          <a:lstStyle/>
+          <a:p>
+            <a:r>
+              <a:rPr lang="en-US" dirty="0" err="1"/>
+              <a:t>KMeans</a:t>
+            </a:r>
+            <a:r>
+              <a:rPr lang="en-US" dirty="0"/>
+              <a:t> Clustering – Scaled Data </a:t>
+            </a:r>
+          </a:p>
+        </p:txBody>
+      </p:sp>
     </p:spTree>
     <p:extLst>
       <p:ext uri="{BB962C8B-B14F-4D97-AF65-F5344CB8AC3E}">

</xml_diff>